<commit_message>
improved outlook integration images
</commit_message>
<xml_diff>
--- a/public/GEE_P14_Meeting_Tracker_V2.pptx
+++ b/public/GEE_P14_Meeting_Tracker_V2.pptx
@@ -6675,16 +6675,8 @@
           <a:lstStyle/>
           <a:p>
             <a:r>
-              <a:rPr lang="de-DE" b="1" dirty="0"/>
-              <a:t>Next </a:t>
-            </a:r>
-            <a:r>
-              <a:rPr lang="de-DE" b="1" dirty="0" err="1"/>
-              <a:t>Steps</a:t>
-            </a:r>
-            <a:r>
-              <a:rPr lang="de-DE" b="1" dirty="0"/>
-              <a:t>….</a:t>
+              <a:rPr lang="en-AU" b="1" dirty="0"/>
+              <a:t>Next Steps….</a:t>
             </a:r>
           </a:p>
         </p:txBody>
@@ -6718,74 +6710,14 @@
           <a:lstStyle/>
           <a:p>
             <a:r>
-              <a:rPr lang="de-DE" b="1" dirty="0" err="1"/>
-              <a:t>Socialize</a:t>
-            </a:r>
-            <a:r>
-              <a:rPr lang="de-DE" b="1" dirty="0"/>
-              <a:t> </a:t>
-            </a:r>
-            <a:r>
-              <a:rPr lang="de-DE" b="1" dirty="0" err="1"/>
-              <a:t>within</a:t>
-            </a:r>
-            <a:r>
-              <a:rPr lang="de-DE" b="1" dirty="0"/>
-              <a:t> DB. Promote not </a:t>
-            </a:r>
-            <a:r>
-              <a:rPr lang="de-DE" b="1" dirty="0" err="1"/>
-              <a:t>as</a:t>
-            </a:r>
-            <a:r>
-              <a:rPr lang="de-DE" b="1" dirty="0"/>
-              <a:t> </a:t>
-            </a:r>
-            <a:r>
-              <a:rPr lang="de-DE" b="1" dirty="0" err="1"/>
-              <a:t>penalty</a:t>
-            </a:r>
-            <a:r>
-              <a:rPr lang="de-DE" b="1" dirty="0"/>
-              <a:t>, </a:t>
-            </a:r>
-          </a:p>
-          <a:p>
-            <a:r>
-              <a:rPr lang="de-DE" b="1" dirty="0"/>
-              <a:t>but </a:t>
-            </a:r>
-            <a:r>
-              <a:rPr lang="de-DE" b="1" dirty="0" err="1"/>
-              <a:t>as</a:t>
-            </a:r>
-            <a:r>
-              <a:rPr lang="de-DE" b="1" dirty="0"/>
-              <a:t> a </a:t>
-            </a:r>
-            <a:r>
-              <a:rPr lang="de-DE" b="1" dirty="0" err="1"/>
-              <a:t>badge</a:t>
-            </a:r>
-            <a:r>
-              <a:rPr lang="de-DE" b="1" dirty="0"/>
-              <a:t> </a:t>
-            </a:r>
-            <a:r>
-              <a:rPr lang="de-DE" b="1" dirty="0" err="1"/>
-              <a:t>of</a:t>
-            </a:r>
-            <a:r>
-              <a:rPr lang="de-DE" b="1" dirty="0"/>
-              <a:t> </a:t>
-            </a:r>
-            <a:r>
-              <a:rPr lang="de-DE" b="1" dirty="0" err="1"/>
-              <a:t>honour</a:t>
-            </a:r>
-            <a:r>
-              <a:rPr lang="de-DE" b="1" dirty="0"/>
-              <a:t>.</a:t>
+              <a:rPr lang="en-AU" b="1" dirty="0"/>
+              <a:t>Socialize within DB. Promote not as penalty, </a:t>
+            </a:r>
+          </a:p>
+          <a:p>
+            <a:r>
+              <a:rPr lang="en-AU" b="1" dirty="0"/>
+              <a:t>but as a badge of honour.</a:t>
             </a:r>
           </a:p>
         </p:txBody>
@@ -6804,7 +6736,7 @@
         </p:nvSpPr>
         <p:spPr>
           <a:xfrm>
-            <a:off x="5882217" y="1232236"/>
+            <a:off x="4876377" y="1075550"/>
             <a:ext cx="5547783" cy="369332"/>
           </a:xfrm>
           <a:prstGeom prst="rect">
@@ -6854,8 +6786,8 @@
         </p:blipFill>
         <p:spPr bwMode="auto">
           <a:xfrm>
-            <a:off x="294969" y="2706170"/>
-            <a:ext cx="4171154" cy="2816826"/>
+            <a:off x="379877" y="2322673"/>
+            <a:ext cx="2885837" cy="2486316"/>
           </a:xfrm>
           <a:prstGeom prst="rect">
             <a:avLst/>
@@ -6886,7 +6818,7 @@
         </p:nvSpPr>
         <p:spPr>
           <a:xfrm>
-            <a:off x="2595761" y="4114583"/>
+            <a:off x="2086310" y="3827200"/>
             <a:ext cx="1870362" cy="1388812"/>
           </a:xfrm>
           <a:prstGeom prst="horizontalScroll">
@@ -6969,7 +6901,7 @@
         </p:blipFill>
         <p:spPr>
           <a:xfrm>
-            <a:off x="3541663" y="4897279"/>
+            <a:off x="3032212" y="4609896"/>
             <a:ext cx="467033" cy="467033"/>
           </a:xfrm>
           <a:prstGeom prst="rect">
@@ -6979,39 +6911,46 @@
       </p:pic>
       <p:pic>
         <p:nvPicPr>
-          <p:cNvPr id="16" name="Content Placeholder 15">
-            <a:extLst>
-              <a:ext uri="{FF2B5EF4-FFF2-40B4-BE49-F238E27FC236}">
-                <a16:creationId xmlns:a16="http://schemas.microsoft.com/office/drawing/2014/main" id="{E03343DB-BCBD-47F0-9FB5-BD76E4F76EBF}"/>
+          <p:cNvPr id="4" name="Grafik 3">
+            <a:extLst>
+              <a:ext uri="{FF2B5EF4-FFF2-40B4-BE49-F238E27FC236}">
+                <a16:creationId xmlns:a16="http://schemas.microsoft.com/office/drawing/2014/main" id="{8CE8807F-1701-4A7F-8FE1-3AEB0C6D1D35}"/>
               </a:ext>
             </a:extLst>
           </p:cNvPr>
           <p:cNvPicPr>
-            <a:picLocks noGrp="1" noChangeAspect="1"/>
+            <a:picLocks noChangeAspect="1"/>
           </p:cNvPicPr>
-          <p:nvPr>
-            <p:ph idx="1"/>
-          </p:nvPr>
+          <p:nvPr/>
         </p:nvPicPr>
         <p:blipFill>
-          <a:blip r:embed="rId5"/>
+          <a:blip r:embed="rId5">
+            <a:extLst>
+              <a:ext uri="{28A0092B-C50C-407E-A947-70E740481C1C}">
+                <a14:useLocalDpi xmlns:a14="http://schemas.microsoft.com/office/drawing/2010/main" val="0"/>
+              </a:ext>
+            </a:extLst>
+          </a:blip>
           <a:stretch>
             <a:fillRect/>
           </a:stretch>
         </p:blipFill>
         <p:spPr>
           <a:xfrm>
-            <a:off x="5161120" y="1773200"/>
-            <a:ext cx="5981497" cy="1760303"/>
+            <a:off x="5008391" y="1652021"/>
+            <a:ext cx="3671976" cy="3978268"/>
           </a:xfrm>
+          <a:prstGeom prst="rect">
+            <a:avLst/>
+          </a:prstGeom>
         </p:spPr>
       </p:pic>
       <p:pic>
         <p:nvPicPr>
-          <p:cNvPr id="18" name="Picture 17">
-            <a:extLst>
-              <a:ext uri="{FF2B5EF4-FFF2-40B4-BE49-F238E27FC236}">
-                <a16:creationId xmlns:a16="http://schemas.microsoft.com/office/drawing/2014/main" id="{4BF4B82A-959D-493C-AFAD-65C44834007A}"/>
+          <p:cNvPr id="11" name="Grafik 10">
+            <a:extLst>
+              <a:ext uri="{FF2B5EF4-FFF2-40B4-BE49-F238E27FC236}">
+                <a16:creationId xmlns:a16="http://schemas.microsoft.com/office/drawing/2014/main" id="{9A12DF2C-F2AA-4202-885F-728AC3A02AB9}"/>
               </a:ext>
             </a:extLst>
           </p:cNvPr>
@@ -7021,15 +6960,21 @@
           <p:nvPr/>
         </p:nvPicPr>
         <p:blipFill>
-          <a:blip r:embed="rId6"/>
+          <a:blip r:embed="rId6">
+            <a:extLst>
+              <a:ext uri="{28A0092B-C50C-407E-A947-70E740481C1C}">
+                <a14:useLocalDpi xmlns:a14="http://schemas.microsoft.com/office/drawing/2010/main" val="0"/>
+              </a:ext>
+            </a:extLst>
+          </a:blip>
           <a:stretch>
             <a:fillRect/>
           </a:stretch>
         </p:blipFill>
         <p:spPr>
           <a:xfrm>
-            <a:off x="7101838" y="3111707"/>
-            <a:ext cx="2381795" cy="2610419"/>
+            <a:off x="7436400" y="3641155"/>
+            <a:ext cx="4548526" cy="2851719"/>
           </a:xfrm>
           <a:prstGeom prst="rect">
             <a:avLst/>

</xml_diff>